<commit_message>
JavaScript DOM & IU Exam preparation
</commit_message>
<xml_diff>
--- a/8. JavaScript UI & DOM/Lectures/06. Canvas-Animations.pptx
+++ b/8. JavaScript UI & DOM/Lectures/06. Canvas-Animations.pptx
@@ -7,7 +7,6 @@
   <p:sldIdLst>
     <p:sldId id="259" r:id="rId2"/>
     <p:sldId id="260" r:id="rId3"/>
-    <p:sldId id="261" r:id="rId4"/>
   </p:sldIdLst>
   <p:sldSz cx="9144000" cy="6858000" type="screen4x3"/>
   <p:notesSz cx="6858000" cy="9144000"/>
@@ -5414,11 +5413,11 @@
             </a:pPr>
             <a:r>
               <a:rPr lang="en-US" sz="2800" dirty="0" smtClean="0"/>
-              <a:t>Finish the aircraft game from the demo</a:t>
-            </a:r>
-          </a:p>
-          <a:p>
-            <a:pPr lvl="1">
+              <a:t>Create a walking Super Mario</a:t>
+            </a:r>
+          </a:p>
+          <a:p>
+            <a:pPr marL="804863" lvl="1" indent="-457200">
               <a:lnSpc>
                 <a:spcPct val="90000"/>
               </a:lnSpc>
@@ -5427,12 +5426,16 @@
               </a:spcBef>
             </a:pPr>
             <a:r>
+              <a:rPr lang="en-US" sz="2600" dirty="0"/>
+              <a:t>Super Mario must be walking indefinitely from left to right on the </a:t>
+            </a:r>
+            <a:r>
               <a:rPr lang="en-US" sz="2600" dirty="0" smtClean="0"/>
-              <a:t>Create flying monsters that can kill the fighter</a:t>
-            </a:r>
-          </a:p>
-          <a:p>
-            <a:pPr lvl="1">
+              <a:t>screen</a:t>
+            </a:r>
+          </a:p>
+          <a:p>
+            <a:pPr marL="804863" lvl="1" indent="-457200">
               <a:lnSpc>
                 <a:spcPct val="90000"/>
               </a:lnSpc>
@@ -5442,19 +5445,12 @@
             </a:pPr>
             <a:r>
               <a:rPr lang="en-US" sz="2600" dirty="0" smtClean="0"/>
-              <a:t>The fighter can kill</a:t>
-            </a:r>
-            <a:r>
-              <a:rPr lang="bg-BG" sz="2600" dirty="0" smtClean="0"/>
-              <a:t> </a:t>
-            </a:r>
-            <a:r>
-              <a:rPr lang="en-US" sz="2600" dirty="0" smtClean="0"/>
-              <a:t>the monsters</a:t>
-            </a:r>
-          </a:p>
-          <a:p>
-            <a:pPr lvl="1">
+              <a:t>The background must be created using SVG</a:t>
+            </a:r>
+            <a:endParaRPr lang="en-US" sz="2600" dirty="0"/>
+          </a:p>
+          <a:p>
+            <a:pPr marL="804863" lvl="1" indent="-457200">
               <a:lnSpc>
                 <a:spcPct val="90000"/>
               </a:lnSpc>
@@ -5464,44 +5460,11 @@
             </a:pPr>
             <a:r>
               <a:rPr lang="en-US" sz="2600" dirty="0" smtClean="0"/>
-              <a:t>When the fighter is destroyed, a high score is calculated based on the time he was alive and the number of monsters killed</a:t>
-            </a:r>
-            <a:endParaRPr lang="en-US" sz="2800" dirty="0" smtClean="0"/>
-          </a:p>
-          <a:p>
-            <a:pPr marL="400050" indent="-400050">
-              <a:lnSpc>
-                <a:spcPct val="90000"/>
-              </a:lnSpc>
-              <a:spcBef>
-                <a:spcPts val="300"/>
-              </a:spcBef>
-              <a:buFont typeface="+mj-lt"/>
-              <a:buAutoNum type="arabicPeriod"/>
-            </a:pPr>
-            <a:r>
-              <a:rPr lang="en-US" sz="2800" dirty="0"/>
-              <a:t>Create the famous game Falling Rocks (</a:t>
-            </a:r>
-            <a:r>
-              <a:rPr lang="en-US" sz="2800" dirty="0" err="1"/>
-              <a:t>Padashti</a:t>
-            </a:r>
-            <a:r>
-              <a:rPr lang="en-US" sz="2800" dirty="0"/>
-              <a:t> </a:t>
-            </a:r>
-            <a:r>
-              <a:rPr lang="en-US" sz="2800" dirty="0" err="1"/>
-              <a:t>kamani</a:t>
-            </a:r>
-            <a:r>
-              <a:rPr lang="en-US" sz="2800" dirty="0" smtClean="0"/>
-              <a:t>)</a:t>
-            </a:r>
-          </a:p>
-          <a:p>
-            <a:pPr lvl="1">
+              <a:t>Additional requirements:</a:t>
+            </a:r>
+          </a:p>
+          <a:p>
+            <a:pPr marL="1096963" lvl="2" indent="-457200">
               <a:lnSpc>
                 <a:spcPct val="90000"/>
               </a:lnSpc>
@@ -5510,16 +5473,27 @@
               </a:spcBef>
             </a:pPr>
             <a:r>
-              <a:rPr lang="en-US" sz="2600" dirty="0"/>
-              <a:t>The </a:t>
-            </a:r>
-            <a:r>
-              <a:rPr lang="en-US" sz="2600" dirty="0" smtClean="0"/>
-              <a:t>game consists of a dwarf at the bottom of the field</a:t>
-            </a:r>
-          </a:p>
-          <a:p>
-            <a:pPr lvl="2">
+              <a:rPr lang="en-US" sz="2400" dirty="0" smtClean="0"/>
+              <a:t>You can use </a:t>
+            </a:r>
+            <a:r>
+              <a:rPr lang="en-US" sz="2400" dirty="0"/>
+              <a:t>sprites </a:t>
+            </a:r>
+            <a:r>
+              <a:rPr lang="en-US" sz="2400" dirty="0" smtClean="0"/>
+              <a:t>from </a:t>
+            </a:r>
+            <a:r>
+              <a:rPr lang="en-US" sz="2400" dirty="0" smtClean="0">
+                <a:hlinkClick r:id="rId2"/>
+              </a:rPr>
+              <a:t>this link</a:t>
+            </a:r>
+            <a:endParaRPr lang="en-US" sz="2400" dirty="0" smtClean="0"/>
+          </a:p>
+          <a:p>
+            <a:pPr marL="1096963" lvl="2" indent="-457200">
               <a:lnSpc>
                 <a:spcPct val="90000"/>
               </a:lnSpc>
@@ -5529,11 +5503,11 @@
             </a:pPr>
             <a:r>
               <a:rPr lang="en-US" sz="2400" dirty="0" smtClean="0"/>
-              <a:t>The dwarf can move left and right</a:t>
-            </a:r>
-          </a:p>
-          <a:p>
-            <a:pPr lvl="1">
+              <a:t>Use Canvas for Super Mario</a:t>
+            </a:r>
+          </a:p>
+          <a:p>
+            <a:pPr marL="1096963" lvl="2" indent="-457200">
               <a:lnSpc>
                 <a:spcPct val="90000"/>
               </a:lnSpc>
@@ -5542,16 +5516,12 @@
               </a:spcBef>
             </a:pPr>
             <a:r>
-              <a:rPr lang="en-US" sz="2600" dirty="0"/>
-              <a:t>Rocks are randomly generated at the top of the </a:t>
-            </a:r>
-            <a:r>
-              <a:rPr lang="en-US" sz="2600" dirty="0" smtClean="0"/>
-              <a:t>field</a:t>
-            </a:r>
-          </a:p>
-          <a:p>
-            <a:pPr lvl="2">
+              <a:rPr lang="en-US" sz="2400" dirty="0" smtClean="0"/>
+              <a:t>Use SVG for the background</a:t>
+            </a:r>
+          </a:p>
+          <a:p>
+            <a:pPr marL="1096963" lvl="2" indent="-457200">
               <a:lnSpc>
                 <a:spcPct val="90000"/>
               </a:lnSpc>
@@ -5561,38 +5531,21 @@
             </a:pPr>
             <a:r>
               <a:rPr lang="en-US" sz="2400" dirty="0" smtClean="0"/>
-              <a:t>The rocks can kill the dwarf</a:t>
-            </a:r>
-          </a:p>
-          <a:p>
-            <a:pPr lvl="1">
-              <a:lnSpc>
-                <a:spcPct val="90000"/>
-              </a:lnSpc>
-              <a:spcBef>
-                <a:spcPts val="300"/>
-              </a:spcBef>
-            </a:pPr>
-            <a:r>
-              <a:rPr lang="en-US" sz="2600" dirty="0" smtClean="0"/>
-              <a:t>The dwarf must evade the rocks as long as possible</a:t>
-            </a:r>
-            <a:endParaRPr lang="en-US" sz="2600" dirty="0"/>
-          </a:p>
-          <a:p>
-            <a:pPr lvl="2">
-              <a:lnSpc>
-                <a:spcPct val="90000"/>
-              </a:lnSpc>
-              <a:spcBef>
-                <a:spcPts val="300"/>
-              </a:spcBef>
-            </a:pPr>
-            <a:endParaRPr lang="en-US" sz="2600" dirty="0">
-              <a:solidFill>
-                <a:srgbClr val="EBFFD2"/>
-              </a:solidFill>
-            </a:endParaRPr>
+              <a:t>You can use Raphael and/or </a:t>
+            </a:r>
+            <a:r>
+              <a:rPr lang="en-US" sz="2400" dirty="0" err="1" smtClean="0"/>
+              <a:t>KineticJS</a:t>
+            </a:r>
+            <a:r>
+              <a:rPr lang="en-US" sz="2400" dirty="0" smtClean="0"/>
+              <a:t>, </a:t>
+            </a:r>
+            <a:r>
+              <a:rPr lang="en-US" sz="2400" smtClean="0"/>
+              <a:t>or native Canvas/SVG APIs</a:t>
+            </a:r>
+            <a:endParaRPr lang="en-US" sz="2400" dirty="0" smtClean="0"/>
           </a:p>
         </p:txBody>
       </p:sp>
@@ -5600,253 +5553,6 @@
     <p:extLst>
       <p:ext uri="{BB962C8B-B14F-4D97-AF65-F5344CB8AC3E}">
         <p14:creationId xmlns:p14="http://schemas.microsoft.com/office/powerpoint/2010/main" val="3466375574"/>
-      </p:ext>
-    </p:extLst>
-  </p:cSld>
-  <p:clrMapOvr>
-    <a:masterClrMapping/>
-  </p:clrMapOvr>
-</p:sld>
-</file>
-
-<file path=ppt/slides/slide3.xml><?xml version="1.0" encoding="utf-8"?>
-<p:sld xmlns:a="http://schemas.openxmlformats.org/drawingml/2006/main" xmlns:r="http://schemas.openxmlformats.org/officeDocument/2006/relationships" xmlns:p="http://schemas.openxmlformats.org/presentationml/2006/main">
-  <p:cSld>
-    <p:spTree>
-      <p:nvGrpSpPr>
-        <p:cNvPr id="1" name=""/>
-        <p:cNvGrpSpPr/>
-        <p:nvPr/>
-      </p:nvGrpSpPr>
-      <p:grpSpPr>
-        <a:xfrm>
-          <a:off x="0" y="0"/>
-          <a:ext cx="0" cy="0"/>
-          <a:chOff x="0" y="0"/>
-          <a:chExt cx="0" cy="0"/>
-        </a:xfrm>
-      </p:grpSpPr>
-      <p:sp>
-        <p:nvSpPr>
-          <p:cNvPr id="2" name="Title 1"/>
-          <p:cNvSpPr>
-            <a:spLocks noGrp="1"/>
-          </p:cNvSpPr>
-          <p:nvPr>
-            <p:ph type="title"/>
-          </p:nvPr>
-        </p:nvSpPr>
-        <p:spPr/>
-        <p:txBody>
-          <a:bodyPr/>
-          <a:lstStyle/>
-          <a:p>
-            <a:r>
-              <a:rPr lang="en-US" dirty="0" smtClean="0"/>
-              <a:t>Homework (2)</a:t>
-            </a:r>
-            <a:endParaRPr lang="en-US" dirty="0"/>
-          </a:p>
-        </p:txBody>
-      </p:sp>
-      <p:sp>
-        <p:nvSpPr>
-          <p:cNvPr id="3" name="Content Placeholder 2"/>
-          <p:cNvSpPr>
-            <a:spLocks noGrp="1"/>
-          </p:cNvSpPr>
-          <p:nvPr>
-            <p:ph idx="1"/>
-          </p:nvPr>
-        </p:nvSpPr>
-        <p:spPr>
-          <a:xfrm>
-            <a:off x="228600" y="1009650"/>
-            <a:ext cx="8686800" cy="5598294"/>
-          </a:xfrm>
-        </p:spPr>
-        <p:txBody>
-          <a:bodyPr/>
-          <a:lstStyle/>
-          <a:p>
-            <a:pPr marL="400050" indent="-400050">
-              <a:lnSpc>
-                <a:spcPct val="90000"/>
-              </a:lnSpc>
-              <a:spcBef>
-                <a:spcPts val="300"/>
-              </a:spcBef>
-              <a:buFont typeface="+mj-lt"/>
-              <a:buAutoNum type="arabicPeriod" startAt="3"/>
-            </a:pPr>
-            <a:r>
-              <a:rPr lang="en-US" sz="2800" dirty="0"/>
-              <a:t>Create a ball that is </a:t>
-            </a:r>
-            <a:r>
-              <a:rPr lang="en-US" sz="2800" dirty="0" smtClean="0"/>
-              <a:t>moving </a:t>
-            </a:r>
-            <a:br>
-              <a:rPr lang="en-US" sz="2800" dirty="0" smtClean="0"/>
-            </a:br>
-            <a:r>
-              <a:rPr lang="en-US" sz="2800" dirty="0" smtClean="0"/>
-              <a:t>in a spiral trajectory</a:t>
-            </a:r>
-            <a:r>
-              <a:rPr lang="en-US" sz="2800" dirty="0"/>
-              <a:t>, </a:t>
-            </a:r>
-            <a:r>
-              <a:rPr lang="en-US" sz="2800" dirty="0" smtClean="0"/>
-              <a:t/>
-            </a:r>
-            <a:br>
-              <a:rPr lang="en-US" sz="2800" dirty="0" smtClean="0"/>
-            </a:br>
-            <a:r>
-              <a:rPr lang="en-US" sz="2800" dirty="0" smtClean="0"/>
-              <a:t>starting from the </a:t>
-            </a:r>
-            <a:r>
-              <a:rPr lang="en-US" sz="2800" dirty="0"/>
-              <a:t>middle of </a:t>
-            </a:r>
-            <a:r>
-              <a:rPr lang="en-US" sz="2800" dirty="0" smtClean="0"/>
-              <a:t/>
-            </a:r>
-            <a:br>
-              <a:rPr lang="en-US" sz="2800" dirty="0" smtClean="0"/>
-            </a:br>
-            <a:r>
-              <a:rPr lang="en-US" sz="2800" dirty="0" smtClean="0"/>
-              <a:t>the </a:t>
-            </a:r>
-            <a:r>
-              <a:rPr lang="en-US" sz="2800" dirty="0"/>
-              <a:t>drawing </a:t>
-            </a:r>
-            <a:r>
-              <a:rPr lang="en-US" sz="2800" dirty="0" smtClean="0"/>
-              <a:t>field</a:t>
-            </a:r>
-            <a:endParaRPr lang="en-US" sz="2600" dirty="0" smtClean="0"/>
-          </a:p>
-          <a:p>
-            <a:pPr lvl="1">
-              <a:lnSpc>
-                <a:spcPct val="90000"/>
-              </a:lnSpc>
-              <a:spcBef>
-                <a:spcPts val="300"/>
-              </a:spcBef>
-            </a:pPr>
-            <a:r>
-              <a:rPr lang="en-US" sz="2600" dirty="0" smtClean="0"/>
-              <a:t>*Hint: find the mathematical </a:t>
-            </a:r>
-            <a:br>
-              <a:rPr lang="en-US" sz="2600" dirty="0" smtClean="0"/>
-            </a:br>
-            <a:r>
-              <a:rPr lang="en-US" sz="2600" dirty="0" smtClean="0"/>
-              <a:t>formula for </a:t>
-            </a:r>
-            <a:r>
-              <a:rPr lang="en-US" sz="2600" dirty="0"/>
-              <a:t>the </a:t>
-            </a:r>
-            <a:r>
-              <a:rPr lang="en-US" sz="2600" dirty="0" smtClean="0">
-                <a:solidFill>
-                  <a:schemeClr val="accent5">
-                    <a:lumMod val="20000"/>
-                    <a:lumOff val="80000"/>
-                  </a:schemeClr>
-                </a:solidFill>
-              </a:rPr>
-              <a:t>Archimedean </a:t>
-            </a:r>
-            <a:br>
-              <a:rPr lang="en-US" sz="2600" dirty="0" smtClean="0">
-                <a:solidFill>
-                  <a:schemeClr val="accent5">
-                    <a:lumMod val="20000"/>
-                    <a:lumOff val="80000"/>
-                  </a:schemeClr>
-                </a:solidFill>
-              </a:rPr>
-            </a:br>
-            <a:r>
-              <a:rPr lang="en-US" sz="2600" dirty="0" smtClean="0">
-                <a:solidFill>
-                  <a:schemeClr val="accent5">
-                    <a:lumMod val="20000"/>
-                    <a:lumOff val="80000"/>
-                  </a:schemeClr>
-                </a:solidFill>
-              </a:rPr>
-              <a:t>spiral</a:t>
-            </a:r>
-            <a:r>
-              <a:rPr lang="en-US" sz="2600" dirty="0" smtClean="0"/>
-              <a:t> to calculate the trajectory of the ball</a:t>
-            </a:r>
-            <a:endParaRPr lang="en-US" sz="2800" dirty="0" smtClean="0"/>
-          </a:p>
-          <a:p>
-            <a:pPr lvl="2">
-              <a:lnSpc>
-                <a:spcPct val="90000"/>
-              </a:lnSpc>
-              <a:spcBef>
-                <a:spcPts val="300"/>
-              </a:spcBef>
-            </a:pPr>
-            <a:endParaRPr lang="en-US" sz="2400" dirty="0"/>
-          </a:p>
-        </p:txBody>
-      </p:sp>
-      <p:pic>
-        <p:nvPicPr>
-          <p:cNvPr id="23" name="Picture 22"/>
-          <p:cNvPicPr>
-            <a:picLocks noChangeAspect="1"/>
-          </p:cNvPicPr>
-          <p:nvPr/>
-        </p:nvPicPr>
-        <p:blipFill>
-          <a:blip r:embed="rId2"/>
-          <a:stretch>
-            <a:fillRect/>
-          </a:stretch>
-        </p:blipFill>
-        <p:spPr>
-          <a:xfrm>
-            <a:off x="5648325" y="1083445"/>
-            <a:ext cx="2106628" cy="2097905"/>
-          </a:xfrm>
-          <a:prstGeom prst="roundRect">
-            <a:avLst>
-              <a:gd name="adj" fmla="val 3025"/>
-            </a:avLst>
-          </a:prstGeom>
-          <a:ln w="38100">
-            <a:solidFill>
-              <a:schemeClr val="accent5">
-                <a:lumMod val="20000"/>
-                <a:lumOff val="80000"/>
-              </a:schemeClr>
-            </a:solidFill>
-          </a:ln>
-        </p:spPr>
-      </p:pic>
-    </p:spTree>
-    <p:extLst>
-      <p:ext uri="{BB962C8B-B14F-4D97-AF65-F5344CB8AC3E}">
-        <p14:creationId xmlns:p14="http://schemas.microsoft.com/office/powerpoint/2010/main" val="3358276690"/>
       </p:ext>
     </p:extLst>
   </p:cSld>

</xml_diff>